<commit_message>
Replace präsentation_11_12_23.pptx mit aktueller Version
</commit_message>
<xml_diff>
--- a/Organisation/präsentation_11_12_23.pptx
+++ b/Organisation/präsentation_11_12_23.pptx
@@ -208,7 +208,7 @@
           <a:p>
             <a:fld id="{2C79F0B7-9739-4206-B0B7-F1633571BE6D}" type="datetimeFigureOut">
               <a:rPr lang="de-DE" smtClean="0"/>
-              <a:t>09.12.2023</a:t>
+              <a:t>10.12.2023</a:t>
             </a:fld>
             <a:endParaRPr lang="de-DE"/>
           </a:p>
@@ -561,7 +561,7 @@
             </a:pPr>
             <a:r>
               <a:rPr lang="de-DE" dirty="0"/>
-              <a:t>(.</a:t>
+              <a:t>	.</a:t>
             </a:r>
             <a:r>
               <a:rPr lang="de-DE" dirty="0" err="1"/>
@@ -571,6 +571,29 @@
               <a:rPr lang="de-DE" dirty="0"/>
               <a:t> ähnlich wie bei Login, </a:t>
             </a:r>
+          </a:p>
+          <a:p>
+            <a:pPr marL="0" marR="0" lvl="0" indent="0" algn="l" defTabSz="914400" rtl="0" eaLnBrk="1" fontAlgn="auto" latinLnBrk="0" hangingPunct="1">
+              <a:lnSpc>
+                <a:spcPct val="100000"/>
+              </a:lnSpc>
+              <a:spcBef>
+                <a:spcPts val="0"/>
+              </a:spcBef>
+              <a:spcAft>
+                <a:spcPts val="0"/>
+              </a:spcAft>
+              <a:buClrTx/>
+              <a:buSzTx/>
+              <a:buFontTx/>
+              <a:buNone/>
+              <a:tabLst/>
+              <a:defRPr/>
+            </a:pPr>
+            <a:r>
+              <a:rPr lang="de-DE" dirty="0"/>
+              <a:t>	</a:t>
+            </a:r>
             <a:r>
               <a:rPr lang="de-DE" dirty="0" err="1"/>
               <a:t>header</a:t>
@@ -585,7 +608,30 @@
             </a:r>
             <a:r>
               <a:rPr lang="de-DE" dirty="0"/>
-              <a:t> noch Register hinzugefügt, im </a:t>
+              <a:t> noch Register hinzugefügt, </a:t>
+            </a:r>
+          </a:p>
+          <a:p>
+            <a:pPr marL="0" marR="0" lvl="0" indent="0" algn="l" defTabSz="914400" rtl="0" eaLnBrk="1" fontAlgn="auto" latinLnBrk="0" hangingPunct="1">
+              <a:lnSpc>
+                <a:spcPct val="100000"/>
+              </a:lnSpc>
+              <a:spcBef>
+                <a:spcPts val="0"/>
+              </a:spcBef>
+              <a:spcAft>
+                <a:spcPts val="0"/>
+              </a:spcAft>
+              <a:buClrTx/>
+              <a:buSzTx/>
+              <a:buFontTx/>
+              <a:buNone/>
+              <a:tabLst/>
+              <a:defRPr/>
+            </a:pPr>
+            <a:r>
+              <a:rPr lang="de-DE" dirty="0"/>
+              <a:t>	im </a:t>
             </a:r>
             <a:r>
               <a:rPr lang="de-DE" dirty="0" err="1"/>
@@ -601,7 +647,30 @@
             </a:r>
             <a:r>
               <a:rPr lang="de-DE" dirty="0"/>
-              <a:t> Attribut, im </a:t>
+              <a:t> Attribut, </a:t>
+            </a:r>
+          </a:p>
+          <a:p>
+            <a:pPr marL="0" marR="0" lvl="0" indent="0" algn="l" defTabSz="914400" rtl="0" eaLnBrk="1" fontAlgn="auto" latinLnBrk="0" hangingPunct="1">
+              <a:lnSpc>
+                <a:spcPct val="100000"/>
+              </a:lnSpc>
+              <a:spcBef>
+                <a:spcPts val="0"/>
+              </a:spcBef>
+              <a:spcAft>
+                <a:spcPts val="0"/>
+              </a:spcAft>
+              <a:buClrTx/>
+              <a:buSzTx/>
+              <a:buFontTx/>
+              <a:buNone/>
+              <a:tabLst/>
+              <a:defRPr/>
+            </a:pPr>
+            <a:r>
+              <a:rPr lang="de-DE" dirty="0"/>
+              <a:t>	im </a:t>
             </a:r>
             <a:r>
               <a:rPr lang="de-DE" dirty="0" err="1"/>
@@ -632,6 +701,76 @@
             <a:r>
               <a:rPr lang="de-DE" dirty="0"/>
               <a:t> Funktion</a:t>
+            </a:r>
+          </a:p>
+          <a:p>
+            <a:r>
+              <a:rPr lang="de-DE" dirty="0"/>
+              <a:t>	Google Places API verwendet</a:t>
+            </a:r>
+          </a:p>
+          <a:p>
+            <a:r>
+              <a:rPr lang="de-DE" dirty="0"/>
+              <a:t>	Dafür wurden Klassen </a:t>
+            </a:r>
+            <a:r>
+              <a:rPr lang="de-DE" dirty="0" err="1"/>
+              <a:t>GooglePlacesAutocompleteApiService</a:t>
+            </a:r>
+            <a:r>
+              <a:rPr lang="de-DE" dirty="0"/>
+              <a:t>, </a:t>
+            </a:r>
+            <a:r>
+              <a:rPr lang="de-DE" dirty="0" err="1"/>
+              <a:t>AutocompleteBean</a:t>
+            </a:r>
+            <a:r>
+              <a:rPr lang="de-DE" dirty="0"/>
+              <a:t> erstellt</a:t>
+            </a:r>
+          </a:p>
+          <a:p>
+            <a:r>
+              <a:rPr lang="de-DE" dirty="0"/>
+              <a:t>	Aufruf der </a:t>
+            </a:r>
+            <a:r>
+              <a:rPr lang="de-DE" dirty="0" err="1"/>
+              <a:t>Geocoding</a:t>
+            </a:r>
+            <a:r>
+              <a:rPr lang="de-DE" dirty="0"/>
+              <a:t> API für Koordinaten der Orte  -&gt; damit kann man dann die Wetter API aufrufen</a:t>
+            </a:r>
+          </a:p>
+          <a:p>
+            <a:r>
+              <a:rPr lang="de-DE" dirty="0"/>
+              <a:t>	Klassen </a:t>
+            </a:r>
+            <a:r>
+              <a:rPr lang="de-DE" dirty="0" err="1"/>
+              <a:t>Geocoding,ApiRequestService</a:t>
+            </a:r>
+            <a:r>
+              <a:rPr lang="de-DE" dirty="0"/>
+              <a:t>, </a:t>
+            </a:r>
+            <a:r>
+              <a:rPr lang="de-DE" dirty="0" err="1"/>
+              <a:t>GeocodingApiDemoBean</a:t>
+            </a:r>
+            <a:r>
+              <a:rPr lang="de-DE" dirty="0"/>
+              <a:t> implementiert</a:t>
+            </a:r>
+          </a:p>
+          <a:p>
+            <a:r>
+              <a:rPr lang="de-DE" dirty="0"/>
+              <a:t>	</a:t>
             </a:r>
           </a:p>
         </p:txBody>
@@ -1007,7 +1146,7 @@
           <a:p>
             <a:fld id="{B6C09B33-535D-4009-AAE1-D8657ED1E57B}" type="datetimeFigureOut">
               <a:rPr lang="de-DE" smtClean="0"/>
-              <a:t>09.12.2023</a:t>
+              <a:t>10.12.2023</a:t>
             </a:fld>
             <a:endParaRPr lang="de-DE"/>
           </a:p>
@@ -1298,7 +1437,7 @@
           <a:p>
             <a:fld id="{B6C09B33-535D-4009-AAE1-D8657ED1E57B}" type="datetimeFigureOut">
               <a:rPr lang="de-DE" smtClean="0"/>
-              <a:t>09.12.2023</a:t>
+              <a:t>10.12.2023</a:t>
             </a:fld>
             <a:endParaRPr lang="de-DE"/>
           </a:p>
@@ -1557,7 +1696,7 @@
           <a:p>
             <a:fld id="{B6C09B33-535D-4009-AAE1-D8657ED1E57B}" type="datetimeFigureOut">
               <a:rPr lang="de-DE" smtClean="0"/>
-              <a:t>09.12.2023</a:t>
+              <a:t>10.12.2023</a:t>
             </a:fld>
             <a:endParaRPr lang="de-DE"/>
           </a:p>
@@ -2026,7 +2165,7 @@
           <a:p>
             <a:fld id="{B6C09B33-535D-4009-AAE1-D8657ED1E57B}" type="datetimeFigureOut">
               <a:rPr lang="de-DE" smtClean="0"/>
-              <a:t>09.12.2023</a:t>
+              <a:t>10.12.2023</a:t>
             </a:fld>
             <a:endParaRPr lang="de-DE"/>
           </a:p>
@@ -2206,7 +2345,7 @@
           <a:p>
             <a:fld id="{B6C09B33-535D-4009-AAE1-D8657ED1E57B}" type="datetimeFigureOut">
               <a:rPr lang="de-DE" smtClean="0"/>
-              <a:t>09.12.2023</a:t>
+              <a:t>10.12.2023</a:t>
             </a:fld>
             <a:endParaRPr lang="de-DE"/>
           </a:p>
@@ -2782,7 +2921,7 @@
           <a:p>
             <a:fld id="{B6C09B33-535D-4009-AAE1-D8657ED1E57B}" type="datetimeFigureOut">
               <a:rPr lang="de-DE" smtClean="0"/>
-              <a:t>09.12.2023</a:t>
+              <a:t>10.12.2023</a:t>
             </a:fld>
             <a:endParaRPr lang="de-DE"/>
           </a:p>
@@ -3114,7 +3253,7 @@
           <a:p>
             <a:fld id="{B6C09B33-535D-4009-AAE1-D8657ED1E57B}" type="datetimeFigureOut">
               <a:rPr lang="de-DE" smtClean="0"/>
-              <a:t>09.12.2023</a:t>
+              <a:t>10.12.2023</a:t>
             </a:fld>
             <a:endParaRPr lang="de-DE"/>
           </a:p>
@@ -3289,7 +3428,7 @@
           <a:p>
             <a:fld id="{B6C09B33-535D-4009-AAE1-D8657ED1E57B}" type="datetimeFigureOut">
               <a:rPr lang="de-DE" smtClean="0"/>
-              <a:t>09.12.2023</a:t>
+              <a:t>10.12.2023</a:t>
             </a:fld>
             <a:endParaRPr lang="de-DE"/>
           </a:p>
@@ -3469,7 +3608,7 @@
           <a:p>
             <a:fld id="{B6C09B33-535D-4009-AAE1-D8657ED1E57B}" type="datetimeFigureOut">
               <a:rPr lang="de-DE" smtClean="0"/>
-              <a:t>09.12.2023</a:t>
+              <a:t>10.12.2023</a:t>
             </a:fld>
             <a:endParaRPr lang="de-DE"/>
           </a:p>
@@ -3639,7 +3778,7 @@
           <a:p>
             <a:fld id="{B6C09B33-535D-4009-AAE1-D8657ED1E57B}" type="datetimeFigureOut">
               <a:rPr lang="de-DE" smtClean="0"/>
-              <a:t>09.12.2023</a:t>
+              <a:t>10.12.2023</a:t>
             </a:fld>
             <a:endParaRPr lang="de-DE"/>
           </a:p>
@@ -3896,7 +4035,7 @@
           <a:p>
             <a:fld id="{B6C09B33-535D-4009-AAE1-D8657ED1E57B}" type="datetimeFigureOut">
               <a:rPr lang="de-DE" smtClean="0"/>
-              <a:t>09.12.2023</a:t>
+              <a:t>10.12.2023</a:t>
             </a:fld>
             <a:endParaRPr lang="de-DE"/>
           </a:p>
@@ -4188,7 +4327,7 @@
           <a:p>
             <a:fld id="{B6C09B33-535D-4009-AAE1-D8657ED1E57B}" type="datetimeFigureOut">
               <a:rPr lang="de-DE" smtClean="0"/>
-              <a:t>09.12.2023</a:t>
+              <a:t>10.12.2023</a:t>
             </a:fld>
             <a:endParaRPr lang="de-DE"/>
           </a:p>
@@ -4618,7 +4757,7 @@
           <a:p>
             <a:fld id="{B6C09B33-535D-4009-AAE1-D8657ED1E57B}" type="datetimeFigureOut">
               <a:rPr lang="de-DE" smtClean="0"/>
-              <a:t>09.12.2023</a:t>
+              <a:t>10.12.2023</a:t>
             </a:fld>
             <a:endParaRPr lang="de-DE"/>
           </a:p>
@@ -4736,7 +4875,7 @@
           <a:p>
             <a:fld id="{B6C09B33-535D-4009-AAE1-D8657ED1E57B}" type="datetimeFigureOut">
               <a:rPr lang="de-DE" smtClean="0"/>
-              <a:t>09.12.2023</a:t>
+              <a:t>10.12.2023</a:t>
             </a:fld>
             <a:endParaRPr lang="de-DE"/>
           </a:p>
@@ -4831,7 +4970,7 @@
           <a:p>
             <a:fld id="{B6C09B33-535D-4009-AAE1-D8657ED1E57B}" type="datetimeFigureOut">
               <a:rPr lang="de-DE" smtClean="0"/>
-              <a:t>09.12.2023</a:t>
+              <a:t>10.12.2023</a:t>
             </a:fld>
             <a:endParaRPr lang="de-DE"/>
           </a:p>
@@ -5114,7 +5253,7 @@
           <a:p>
             <a:fld id="{B6C09B33-535D-4009-AAE1-D8657ED1E57B}" type="datetimeFigureOut">
               <a:rPr lang="de-DE" smtClean="0"/>
-              <a:t>09.12.2023</a:t>
+              <a:t>10.12.2023</a:t>
             </a:fld>
             <a:endParaRPr lang="de-DE"/>
           </a:p>
@@ -5405,7 +5544,7 @@
           <a:p>
             <a:fld id="{B6C09B33-535D-4009-AAE1-D8657ED1E57B}" type="datetimeFigureOut">
               <a:rPr lang="de-DE" smtClean="0"/>
-              <a:t>09.12.2023</a:t>
+              <a:t>10.12.2023</a:t>
             </a:fld>
             <a:endParaRPr lang="de-DE"/>
           </a:p>
@@ -5636,7 +5775,7 @@
           <a:p>
             <a:fld id="{B6C09B33-535D-4009-AAE1-D8657ED1E57B}" type="datetimeFigureOut">
               <a:rPr lang="de-DE" smtClean="0"/>
-              <a:t>09.12.2023</a:t>
+              <a:t>10.12.2023</a:t>
             </a:fld>
             <a:endParaRPr lang="de-DE"/>
           </a:p>
@@ -7074,80 +7213,19 @@
           <a:p>
             <a:r>
               <a:rPr lang="de-DE" dirty="0"/>
-              <a:t>Register Funktion (</a:t>
+              <a:t>Anpassung des Skeleton-projekts auf die Applikation</a:t>
+            </a:r>
+          </a:p>
+          <a:p>
+            <a:r>
+              <a:rPr lang="de-DE" dirty="0"/>
+              <a:t>Registrierungsfunktion für neue </a:t>
             </a:r>
             <a:r>
               <a:rPr lang="de-DE" dirty="0" err="1"/>
-              <a:t>xhtml</a:t>
-            </a:r>
-            <a:r>
-              <a:rPr lang="de-DE" dirty="0"/>
-              <a:t> ähnlich wie bei </a:t>
-            </a:r>
-            <a:r>
-              <a:rPr lang="de-DE" dirty="0" err="1"/>
-              <a:t>login</a:t>
-            </a:r>
-            <a:r>
-              <a:rPr lang="de-DE" dirty="0"/>
-              <a:t>, </a:t>
-            </a:r>
-            <a:r>
-              <a:rPr lang="de-DE" dirty="0" err="1"/>
-              <a:t>header</a:t>
-            </a:r>
-            <a:r>
-              <a:rPr lang="de-DE" dirty="0"/>
-              <a:t> </a:t>
-            </a:r>
-            <a:r>
-              <a:rPr lang="de-DE" dirty="0" err="1"/>
-              <a:t>xhtml</a:t>
-            </a:r>
-            <a:r>
-              <a:rPr lang="de-DE" dirty="0"/>
-              <a:t> noch </a:t>
-            </a:r>
-            <a:r>
-              <a:rPr lang="de-DE" dirty="0" err="1"/>
-              <a:t>register</a:t>
-            </a:r>
-            <a:r>
-              <a:rPr lang="de-DE" dirty="0"/>
-              <a:t> </a:t>
-            </a:r>
-            <a:r>
-              <a:rPr lang="de-DE" dirty="0" err="1"/>
-              <a:t>inzugefügt</a:t>
-            </a:r>
-            <a:r>
-              <a:rPr lang="de-DE" dirty="0"/>
-              <a:t>, im </a:t>
-            </a:r>
-            <a:r>
-              <a:rPr lang="de-DE" dirty="0" err="1"/>
-              <a:t>repository</a:t>
-            </a:r>
-            <a:r>
-              <a:rPr lang="de-DE" dirty="0"/>
-              <a:t> neue User Attribut, im </a:t>
-            </a:r>
-            <a:r>
-              <a:rPr lang="de-DE" dirty="0" err="1"/>
-              <a:t>serivce</a:t>
-            </a:r>
-            <a:r>
-              <a:rPr lang="de-DE" dirty="0"/>
-              <a:t> </a:t>
-            </a:r>
-            <a:r>
-              <a:rPr lang="de-DE" dirty="0" err="1"/>
-              <a:t>saveUser</a:t>
-            </a:r>
-            <a:r>
-              <a:rPr lang="de-DE" dirty="0"/>
-              <a:t> braucht man keine Admin Rolle um das zu machen)</a:t>
-            </a:r>
+              <a:t>user</a:t>
+            </a:r>
+            <a:endParaRPr lang="de-DE" dirty="0"/>
           </a:p>
           <a:p>
             <a:r>
@@ -7156,39 +7234,7 @@
             </a:r>
             <a:r>
               <a:rPr lang="de-DE" dirty="0"/>
-              <a:t> </a:t>
-            </a:r>
-            <a:r>
-              <a:rPr lang="de-DE" dirty="0" err="1"/>
-              <a:t>funktion</a:t>
-            </a:r>
-            <a:r>
-              <a:rPr lang="de-DE" dirty="0"/>
-              <a:t> mit </a:t>
-            </a:r>
-            <a:r>
-              <a:rPr lang="de-DE" dirty="0" err="1"/>
-              <a:t>google</a:t>
-            </a:r>
-            <a:r>
-              <a:rPr lang="de-DE" dirty="0"/>
-              <a:t> </a:t>
-            </a:r>
-            <a:r>
-              <a:rPr lang="de-DE" dirty="0" err="1"/>
-              <a:t>maps</a:t>
-            </a:r>
-            <a:r>
-              <a:rPr lang="de-DE" dirty="0"/>
-              <a:t> </a:t>
-            </a:r>
-            <a:r>
-              <a:rPr lang="de-DE" dirty="0" err="1"/>
-              <a:t>erweiterung</a:t>
-            </a:r>
-            <a:r>
-              <a:rPr lang="de-DE" dirty="0"/>
-              <a:t> eingefügt.</a:t>
+              <a:t> zur Suche von Orten eingebunden</a:t>
             </a:r>
           </a:p>
           <a:p>
@@ -7448,7 +7494,7 @@
         <p:spPr/>
         <p:txBody>
           <a:bodyPr>
-            <a:normAutofit fontScale="92500" lnSpcReduction="10000"/>
+            <a:normAutofit/>
           </a:bodyPr>
           <a:lstStyle/>
           <a:p>
@@ -7513,16 +7559,6 @@
             <a:r>
               <a:rPr lang="de-DE" dirty="0"/>
               <a:t>Fertigstellung des Abonnement-systems</a:t>
-            </a:r>
-          </a:p>
-          <a:p>
-            <a:pPr lvl="1">
-              <a:buFont typeface="Courier New" panose="02070309020205020404" pitchFamily="49" charset="0"/>
-              <a:buChar char="o"/>
-            </a:pPr>
-            <a:r>
-              <a:rPr lang="de-DE" dirty="0"/>
-              <a:t>Fertigstellung der Homepage</a:t>
             </a:r>
           </a:p>
           <a:p>
@@ -7610,7 +7646,7 @@
         <p:spPr/>
         <p:txBody>
           <a:bodyPr>
-            <a:normAutofit lnSpcReduction="10000"/>
+            <a:normAutofit fontScale="92500" lnSpcReduction="10000"/>
           </a:bodyPr>
           <a:lstStyle/>
           <a:p>
@@ -7644,11 +7680,7 @@
             </a:pPr>
             <a:r>
               <a:rPr lang="de-DE" sz="1600" dirty="0"/>
-              <a:t>Integration</a:t>
-            </a:r>
-            <a:r>
-              <a:rPr lang="de-DE" dirty="0"/>
-              <a:t> der Backend-Funktionalitäten auf das Frontend</a:t>
+              <a:t>Fertigstellung der Homepage</a:t>
             </a:r>
           </a:p>
           <a:p>
@@ -7657,16 +7689,12 @@
               <a:buChar char="o"/>
             </a:pPr>
             <a:r>
+              <a:rPr lang="de-DE" sz="1600" dirty="0"/>
+              <a:t>Integration</a:t>
+            </a:r>
+            <a:r>
               <a:rPr lang="de-DE" dirty="0"/>
-              <a:t>Sicherstellung der Browser-</a:t>
-            </a:r>
-            <a:r>
-              <a:rPr lang="de-DE" dirty="0" err="1"/>
-              <a:t>kompabilität</a:t>
-            </a:r>
-            <a:r>
-              <a:rPr lang="de-DE" dirty="0"/>
-              <a:t> der Anwendung mit den gängigsten Browsern</a:t>
+              <a:t> der Backend-Funktionalitäten auf das Frontend</a:t>
             </a:r>
           </a:p>
           <a:p>
@@ -7676,7 +7704,15 @@
             </a:pPr>
             <a:r>
               <a:rPr lang="de-DE" dirty="0"/>
-              <a:t>Testen der Funktionalitäten</a:t>
+              <a:t>Sicherstellung der Browser-</a:t>
+            </a:r>
+            <a:r>
+              <a:rPr lang="de-DE" dirty="0" err="1"/>
+              <a:t>kompabilität</a:t>
+            </a:r>
+            <a:r>
+              <a:rPr lang="de-DE" dirty="0"/>
+              <a:t> der Anwendung mit den gängigsten Browsern</a:t>
             </a:r>
           </a:p>
           <a:p>
@@ -7686,8 +7722,25 @@
             </a:pPr>
             <a:r>
               <a:rPr lang="de-DE" dirty="0"/>
+              <a:t>Testen der Funktionalitäten</a:t>
+            </a:r>
+          </a:p>
+          <a:p>
+            <a:pPr lvl="1">
+              <a:buFont typeface="Courier New" panose="02070309020205020404" pitchFamily="49" charset="0"/>
+              <a:buChar char="o"/>
+            </a:pPr>
+            <a:r>
+              <a:rPr lang="de-DE" dirty="0"/>
               <a:t>Ausnahmesituationen angemessen behandeln</a:t>
             </a:r>
+          </a:p>
+          <a:p>
+            <a:pPr lvl="1">
+              <a:buFont typeface="Courier New" panose="02070309020205020404" pitchFamily="49" charset="0"/>
+              <a:buChar char="o"/>
+            </a:pPr>
+            <a:endParaRPr lang="de-DE" dirty="0"/>
           </a:p>
         </p:txBody>
       </p:sp>

</xml_diff>